<commit_message>
cleanup of part 1
* Decided on Font (Open Sans I think)
* Redesigned how 4 example cases were viewed
* HTML wizardy (for me) to make it look good
* Script rewording
* Redrawing Virginia Case Study Visualizations
</commit_message>
<xml_diff>
--- a/bios of 4 poorly punished cases.pptx
+++ b/bios of 4 poorly punished cases.pptx
@@ -107,6 +107,11 @@
       </a:defRPr>
     </a:lvl9pPr>
   </p:defaultTextStyle>
+  <p:extLst>
+    <p:ext uri="{EFAFB233-063F-42B5-8137-9DF3F51BA10A}">
+      <p15:sldGuideLst xmlns:p15="http://schemas.microsoft.com/office/powerpoint/2012/main"/>
+    </p:ext>
+  </p:extLst>
 </p:presentation>
 </file>
 
@@ -241,7 +246,7 @@
           <a:p>
             <a:fld id="{F645E480-4895-4409-B628-325A092C4122}" type="datetimeFigureOut">
               <a:rPr lang="en-US" smtClean="0"/>
-              <a:t>22-Apr-21</a:t>
+              <a:t>29-Apr-21</a:t>
             </a:fld>
             <a:endParaRPr lang="en-US"/>
           </a:p>
@@ -411,7 +416,7 @@
           <a:p>
             <a:fld id="{F645E480-4895-4409-B628-325A092C4122}" type="datetimeFigureOut">
               <a:rPr lang="en-US" smtClean="0"/>
-              <a:t>22-Apr-21</a:t>
+              <a:t>29-Apr-21</a:t>
             </a:fld>
             <a:endParaRPr lang="en-US"/>
           </a:p>
@@ -591,7 +596,7 @@
           <a:p>
             <a:fld id="{F645E480-4895-4409-B628-325A092C4122}" type="datetimeFigureOut">
               <a:rPr lang="en-US" smtClean="0"/>
-              <a:t>22-Apr-21</a:t>
+              <a:t>29-Apr-21</a:t>
             </a:fld>
             <a:endParaRPr lang="en-US"/>
           </a:p>
@@ -761,7 +766,7 @@
           <a:p>
             <a:fld id="{F645E480-4895-4409-B628-325A092C4122}" type="datetimeFigureOut">
               <a:rPr lang="en-US" smtClean="0"/>
-              <a:t>22-Apr-21</a:t>
+              <a:t>29-Apr-21</a:t>
             </a:fld>
             <a:endParaRPr lang="en-US"/>
           </a:p>
@@ -1005,7 +1010,7 @@
           <a:p>
             <a:fld id="{F645E480-4895-4409-B628-325A092C4122}" type="datetimeFigureOut">
               <a:rPr lang="en-US" smtClean="0"/>
-              <a:t>22-Apr-21</a:t>
+              <a:t>29-Apr-21</a:t>
             </a:fld>
             <a:endParaRPr lang="en-US"/>
           </a:p>
@@ -1237,7 +1242,7 @@
           <a:p>
             <a:fld id="{F645E480-4895-4409-B628-325A092C4122}" type="datetimeFigureOut">
               <a:rPr lang="en-US" smtClean="0"/>
-              <a:t>22-Apr-21</a:t>
+              <a:t>29-Apr-21</a:t>
             </a:fld>
             <a:endParaRPr lang="en-US"/>
           </a:p>
@@ -1604,7 +1609,7 @@
           <a:p>
             <a:fld id="{F645E480-4895-4409-B628-325A092C4122}" type="datetimeFigureOut">
               <a:rPr lang="en-US" smtClean="0"/>
-              <a:t>22-Apr-21</a:t>
+              <a:t>29-Apr-21</a:t>
             </a:fld>
             <a:endParaRPr lang="en-US"/>
           </a:p>
@@ -1722,7 +1727,7 @@
           <a:p>
             <a:fld id="{F645E480-4895-4409-B628-325A092C4122}" type="datetimeFigureOut">
               <a:rPr lang="en-US" smtClean="0"/>
-              <a:t>22-Apr-21</a:t>
+              <a:t>29-Apr-21</a:t>
             </a:fld>
             <a:endParaRPr lang="en-US"/>
           </a:p>
@@ -1817,7 +1822,7 @@
           <a:p>
             <a:fld id="{F645E480-4895-4409-B628-325A092C4122}" type="datetimeFigureOut">
               <a:rPr lang="en-US" smtClean="0"/>
-              <a:t>22-Apr-21</a:t>
+              <a:t>29-Apr-21</a:t>
             </a:fld>
             <a:endParaRPr lang="en-US"/>
           </a:p>
@@ -2094,7 +2099,7 @@
           <a:p>
             <a:fld id="{F645E480-4895-4409-B628-325A092C4122}" type="datetimeFigureOut">
               <a:rPr lang="en-US" smtClean="0"/>
-              <a:t>22-Apr-21</a:t>
+              <a:t>29-Apr-21</a:t>
             </a:fld>
             <a:endParaRPr lang="en-US"/>
           </a:p>
@@ -2351,7 +2356,7 @@
           <a:p>
             <a:fld id="{F645E480-4895-4409-B628-325A092C4122}" type="datetimeFigureOut">
               <a:rPr lang="en-US" smtClean="0"/>
-              <a:t>22-Apr-21</a:t>
+              <a:t>29-Apr-21</a:t>
             </a:fld>
             <a:endParaRPr lang="en-US"/>
           </a:p>
@@ -2564,7 +2569,7 @@
           <a:p>
             <a:fld id="{F645E480-4895-4409-B628-325A092C4122}" type="datetimeFigureOut">
               <a:rPr lang="en-US" smtClean="0"/>
-              <a:t>22-Apr-21</a:t>
+              <a:t>29-Apr-21</a:t>
             </a:fld>
             <a:endParaRPr lang="en-US"/>
           </a:p>
@@ -3835,15 +3840,7 @@
             </a:r>
             <a:r>
               <a:rPr lang="en-US" sz="2800" dirty="0"/>
-              <a:t>Multiple previous offenses, the current offense, stealing 2 shirts considered a </a:t>
-            </a:r>
-            <a:r>
-              <a:rPr lang="en-US" sz="2800"/>
-              <a:t>felony before 2010</a:t>
-            </a:r>
-            <a:r>
-              <a:rPr lang="en-US" sz="2800" dirty="0"/>
-              <a:t>.</a:t>
+              <a:t>Multiple previous offenses, the current offense, stealing 2 shirts considered a felony before 2010.</a:t>
             </a:r>
           </a:p>
           <a:p>

</xml_diff>